<commit_message>
adding setVariableChangeHook to section 4.
</commit_message>
<xml_diff>
--- a/papers/pldi2011/drawings.pptx
+++ b/papers/pldi2011/drawings.pptx
@@ -5145,8 +5145,9 @@
                       <a:pPr algn="ctr"/>
                       <a:r>
                         <a:rPr lang="en-US" sz="900" dirty="0" smtClean="0"/>
-                        <a:t>X</a:t>
-                      </a:r>
+                        <a:t>x</a:t>
+                      </a:r>
+                      <a:endParaRPr lang="en-US" sz="900" dirty="0" smtClean="0"/>
                     </a:p>
                     <a:p>
                       <a:pPr algn="ctr"/>
@@ -5734,14 +5735,15 @@
                       <a:pPr algn="ctr"/>
                       <a:r>
                         <a:rPr lang="en-US" sz="900" dirty="0" smtClean="0"/>
-                        <a:t>Y </a:t>
-                      </a:r>
+                        <a:t>y</a:t>
+                      </a:r>
+                      <a:endParaRPr lang="en-US" sz="900" dirty="0" smtClean="0"/>
                     </a:p>
                     <a:p>
                       <a:pPr algn="ctr"/>
                       <a:r>
                         <a:rPr lang="en-US" sz="900" baseline="0" dirty="0" smtClean="0"/>
-                        <a:t>changes</a:t>
+                        <a:t>Changes</a:t>
                       </a:r>
                       <a:endParaRPr lang="en-US" sz="900" b="1" dirty="0" smtClean="0">
                         <a:solidFill>

</xml_diff>